<commit_message>
introduced function to import figures, not working for charts and graphs
</commit_message>
<xml_diff>
--- a/files/ppt_demo.pptx
+++ b/files/ppt_demo.pptx
@@ -6,7 +6,7 @@
     <p:sldMasterId id="2147483699" r:id="rId11"/>
   </p:sldMasterIdLst>
   <p:notesMasterIdLst>
-    <p:notesMasterId r:id="rId25"/>
+    <p:notesMasterId r:id="rId26"/>
   </p:notesMasterIdLst>
   <p:sldIdLst>
     <p:sldId id="257" r:id="rId12"/>
@@ -19,9 +19,10 @@
     <p:sldId id="494" r:id="rId19"/>
     <p:sldId id="495" r:id="rId20"/>
     <p:sldId id="493" r:id="rId21"/>
-    <p:sldId id="339" r:id="rId22"/>
-    <p:sldId id="380" r:id="rId23"/>
-    <p:sldId id="330" r:id="rId24"/>
+    <p:sldId id="496" r:id="rId22"/>
+    <p:sldId id="339" r:id="rId23"/>
+    <p:sldId id="380" r:id="rId24"/>
+    <p:sldId id="330" r:id="rId25"/>
   </p:sldIdLst>
   <p:sldSz cx="12192000" cy="6858000"/>
   <p:notesSz cx="6858000" cy="9144000"/>
@@ -135,6 +136,7 @@
             <p14:sldId id="494"/>
             <p14:sldId id="495"/>
             <p14:sldId id="493"/>
+            <p14:sldId id="496"/>
           </p14:sldIdLst>
         </p14:section>
         <p14:section name="Context" id="{065BED4C-6380-4DDB-97EA-F07556E2D9B4}">
@@ -242,7 +244,6 @@
           </a:p>
         </c:rich>
       </c:tx>
-      <c:layout/>
       <c:overlay val="0"/>
       <c:spPr>
         <a:noFill/>
@@ -875,7 +876,6 @@
         <c:idx val="9"/>
         <c:delete val="1"/>
       </c:legendEntry>
-      <c:layout/>
       <c:overlay val="0"/>
       <c:spPr>
         <a:noFill/>
@@ -2472,6 +2472,13 @@
         </dgm:presLayoutVars>
       </dgm:prSet>
       <dgm:spPr/>
+      <dgm:t>
+        <a:bodyPr/>
+        <a:lstStyle/>
+        <a:p>
+          <a:endParaRPr lang="en-US"/>
+        </a:p>
+      </dgm:t>
     </dgm:pt>
     <dgm:pt modelId="{FBBE1E9B-7D6D-4EBF-A90A-18F5A44CF0BD}" type="pres">
       <dgm:prSet presAssocID="{13989C2D-5BBD-4C79-89C8-04F5098C2D1D}" presName="composite" presStyleCnt="0"/>
@@ -2486,6 +2493,13 @@
         </dgm:presLayoutVars>
       </dgm:prSet>
       <dgm:spPr/>
+      <dgm:t>
+        <a:bodyPr/>
+        <a:lstStyle/>
+        <a:p>
+          <a:endParaRPr lang="en-US"/>
+        </a:p>
+      </dgm:t>
     </dgm:pt>
     <dgm:pt modelId="{BCF88D8A-FAF2-44AB-8CE4-A78B28883FED}" type="pres">
       <dgm:prSet presAssocID="{13989C2D-5BBD-4C79-89C8-04F5098C2D1D}" presName="Childtext1" presStyleLbl="revTx" presStyleIdx="0" presStyleCnt="3">
@@ -2496,6 +2510,13 @@
         </dgm:presLayoutVars>
       </dgm:prSet>
       <dgm:spPr/>
+      <dgm:t>
+        <a:bodyPr/>
+        <a:lstStyle/>
+        <a:p>
+          <a:endParaRPr lang="en-US"/>
+        </a:p>
+      </dgm:t>
     </dgm:pt>
     <dgm:pt modelId="{79500A40-9EEA-43CA-A468-E088D4BA6D70}" type="pres">
       <dgm:prSet presAssocID="{13989C2D-5BBD-4C79-89C8-04F5098C2D1D}" presName="BalanceSpacing" presStyleCnt="0"/>
@@ -2508,6 +2529,13 @@
     <dgm:pt modelId="{CB9678F9-7D6E-4B2B-A26F-490F905A17B5}" type="pres">
       <dgm:prSet presAssocID="{C31D5DD6-C492-4017-AEC5-16326E39A0B1}" presName="Accent1Text" presStyleLbl="node1" presStyleIdx="1" presStyleCnt="6"/>
       <dgm:spPr/>
+      <dgm:t>
+        <a:bodyPr/>
+        <a:lstStyle/>
+        <a:p>
+          <a:endParaRPr lang="en-US"/>
+        </a:p>
+      </dgm:t>
     </dgm:pt>
     <dgm:pt modelId="{15A6742B-6728-4E0E-B2C2-4DB74ED5D7DE}" type="pres">
       <dgm:prSet presAssocID="{C31D5DD6-C492-4017-AEC5-16326E39A0B1}" presName="spaceBetweenRectangles" presStyleCnt="0"/>
@@ -2526,6 +2554,13 @@
         </dgm:presLayoutVars>
       </dgm:prSet>
       <dgm:spPr/>
+      <dgm:t>
+        <a:bodyPr/>
+        <a:lstStyle/>
+        <a:p>
+          <a:endParaRPr lang="en-US"/>
+        </a:p>
+      </dgm:t>
     </dgm:pt>
     <dgm:pt modelId="{5191775C-C28A-43D4-8072-9D8259C2FAA7}" type="pres">
       <dgm:prSet presAssocID="{7A38B58A-A11A-41D6-B673-E485D411F451}" presName="Childtext1" presStyleLbl="revTx" presStyleIdx="1" presStyleCnt="3">
@@ -2536,6 +2571,13 @@
         </dgm:presLayoutVars>
       </dgm:prSet>
       <dgm:spPr/>
+      <dgm:t>
+        <a:bodyPr/>
+        <a:lstStyle/>
+        <a:p>
+          <a:endParaRPr lang="en-US"/>
+        </a:p>
+      </dgm:t>
     </dgm:pt>
     <dgm:pt modelId="{11AB6FE1-425C-41F9-B050-C913AF1FBC2F}" type="pres">
       <dgm:prSet presAssocID="{7A38B58A-A11A-41D6-B673-E485D411F451}" presName="BalanceSpacing" presStyleCnt="0"/>
@@ -2548,6 +2590,13 @@
     <dgm:pt modelId="{958E7863-7E03-4CBC-951F-059E66E465E3}" type="pres">
       <dgm:prSet presAssocID="{25D57FB3-053C-44B6-9F14-C1B73557C87F}" presName="Accent1Text" presStyleLbl="node1" presStyleIdx="3" presStyleCnt="6"/>
       <dgm:spPr/>
+      <dgm:t>
+        <a:bodyPr/>
+        <a:lstStyle/>
+        <a:p>
+          <a:endParaRPr lang="en-US"/>
+        </a:p>
+      </dgm:t>
     </dgm:pt>
     <dgm:pt modelId="{530997C0-A59A-4570-998B-35BDE1159949}" type="pres">
       <dgm:prSet presAssocID="{25D57FB3-053C-44B6-9F14-C1B73557C87F}" presName="spaceBetweenRectangles" presStyleCnt="0"/>
@@ -2583,6 +2632,13 @@
         </dgm:presLayoutVars>
       </dgm:prSet>
       <dgm:spPr/>
+      <dgm:t>
+        <a:bodyPr/>
+        <a:lstStyle/>
+        <a:p>
+          <a:endParaRPr lang="en-US"/>
+        </a:p>
+      </dgm:t>
     </dgm:pt>
     <dgm:pt modelId="{97D90B55-A70C-4A58-AA46-B13F368B55FE}" type="pres">
       <dgm:prSet presAssocID="{3A882E34-6617-4325-8A39-F5280B090C59}" presName="BalanceSpacing" presStyleCnt="0"/>
@@ -2595,6 +2651,13 @@
     <dgm:pt modelId="{EA8D8AEF-CA32-444E-8227-C3B93B3A7FDD}" type="pres">
       <dgm:prSet presAssocID="{1D81F829-D153-4CE3-A785-095A58AAB5F8}" presName="Accent1Text" presStyleLbl="node1" presStyleIdx="5" presStyleCnt="6"/>
       <dgm:spPr/>
+      <dgm:t>
+        <a:bodyPr/>
+        <a:lstStyle/>
+        <a:p>
+          <a:endParaRPr lang="en-US"/>
+        </a:p>
+      </dgm:t>
     </dgm:pt>
   </dgm:ptLst>
   <dgm:cxnLst>
@@ -4770,7 +4833,7 @@
           <a:p>
             <a:fld id="{C53FC889-3B05-4F6A-9AB7-C2521E883D0A}" type="datetimeFigureOut">
               <a:rPr lang="en-GB" smtClean="0"/>
-              <a:t>24/03/2020</a:t>
+              <a:t>26/03/2020</a:t>
             </a:fld>
             <a:endParaRPr lang="en-GB" dirty="0"/>
           </a:p>
@@ -5821,7 +5884,7 @@
           <a:p>
             <a:fld id="{253E99D3-575E-4B33-AEE3-580024E0F63F}" type="slidenum">
               <a:rPr lang="en-GB" smtClean="0"/>
-              <a:t>11</a:t>
+              <a:t>12</a:t>
             </a:fld>
             <a:endParaRPr lang="en-GB"/>
           </a:p>
@@ -5905,7 +5968,7 @@
           <a:p>
             <a:fld id="{253E99D3-575E-4B33-AEE3-580024E0F63F}" type="slidenum">
               <a:rPr lang="en-GB" smtClean="0"/>
-              <a:t>12</a:t>
+              <a:t>13</a:t>
             </a:fld>
             <a:endParaRPr lang="en-GB"/>
           </a:p>
@@ -6075,7 +6138,7 @@
           <a:p>
             <a:fld id="{9EFE7453-B082-4124-B5AE-B87EE023CDB1}" type="datetime1">
               <a:rPr lang="sv-SE" smtClean="0"/>
-              <a:t>2020-03-24</a:t>
+              <a:t>2020-03-26</a:t>
             </a:fld>
             <a:endParaRPr lang="en-GB" dirty="0"/>
           </a:p>
@@ -6321,7 +6384,7 @@
                   <a:prstClr val="black"/>
                 </a:solidFill>
               </a:rPr>
-              <a:t>2020-03-24</a:t>
+              <a:t>2020-03-26</a:t>
             </a:fld>
             <a:endParaRPr lang="en-GB" dirty="0">
               <a:solidFill>
@@ -6689,7 +6752,7 @@
                   <a:prstClr val="black"/>
                 </a:solidFill>
               </a:rPr>
-              <a:t>2020-03-24</a:t>
+              <a:t>2020-03-26</a:t>
             </a:fld>
             <a:endParaRPr lang="en-GB" dirty="0">
               <a:solidFill>
@@ -6972,7 +7035,7 @@
                   <a:prstClr val="black"/>
                 </a:solidFill>
               </a:rPr>
-              <a:t>2020-03-24</a:t>
+              <a:t>2020-03-26</a:t>
             </a:fld>
             <a:endParaRPr lang="en-GB" dirty="0">
               <a:solidFill>
@@ -7298,7 +7361,7 @@
                   <a:prstClr val="black"/>
                 </a:solidFill>
               </a:rPr>
-              <a:t>2020-03-24</a:t>
+              <a:t>2020-03-26</a:t>
             </a:fld>
             <a:endParaRPr lang="en-GB" dirty="0">
               <a:solidFill>
@@ -7569,7 +7632,7 @@
                   <a:prstClr val="black"/>
                 </a:solidFill>
               </a:rPr>
-              <a:t>2020-03-24</a:t>
+              <a:t>2020-03-26</a:t>
             </a:fld>
             <a:endParaRPr lang="en-GB" dirty="0">
               <a:solidFill>
@@ -7755,7 +7818,7 @@
                   <a:prstClr val="black"/>
                 </a:solidFill>
               </a:rPr>
-              <a:t>2020-03-24</a:t>
+              <a:t>2020-03-26</a:t>
             </a:fld>
             <a:endParaRPr lang="en-GB" dirty="0">
               <a:solidFill>
@@ -10036,7 +10099,7 @@
                   <a:prstClr val="black"/>
                 </a:solidFill>
               </a:rPr>
-              <a:t>2020-03-24</a:t>
+              <a:t>2020-03-26</a:t>
             </a:fld>
             <a:endParaRPr lang="en-GB" dirty="0">
               <a:solidFill>
@@ -10785,7 +10848,7 @@
             </a:pPr>
             <a:fld id="{D1537DF4-BE14-43E4-9A37-FFE4AFD6E832}" type="datetime1">
               <a:rPr lang="sv-SE" smtClean="0"/>
-              <a:t>2020-03-24</a:t>
+              <a:t>2020-03-26</a:t>
             </a:fld>
             <a:endParaRPr lang="sv-SE"/>
           </a:p>
@@ -11009,7 +11072,7 @@
           <a:p>
             <a:fld id="{80F358A9-049B-44CD-82AF-D1F2A38D371E}" type="datetime1">
               <a:rPr lang="sv-SE" smtClean="0"/>
-              <a:t>2020-03-24</a:t>
+              <a:t>2020-03-26</a:t>
             </a:fld>
             <a:endParaRPr lang="sv-SE"/>
           </a:p>
@@ -11178,7 +11241,7 @@
           <a:p>
             <a:fld id="{0EFFECE1-EFDB-4ED4-A92B-EC11843FA500}" type="datetime1">
               <a:rPr lang="sv-SE" smtClean="0"/>
-              <a:t>2020-03-24</a:t>
+              <a:t>2020-03-26</a:t>
             </a:fld>
             <a:endParaRPr lang="en-US" dirty="0"/>
           </a:p>
@@ -11429,7 +11492,7 @@
           <a:p>
             <a:fld id="{3E8B38C6-DEFB-43C3-9001-532227D2C227}" type="datetime1">
               <a:rPr lang="sv-SE" smtClean="0"/>
-              <a:t>2020-03-24</a:t>
+              <a:t>2020-03-26</a:t>
             </a:fld>
             <a:endParaRPr lang="sv-SE"/>
           </a:p>
@@ -11679,7 +11742,7 @@
           <a:p>
             <a:fld id="{4D6B0352-3FAF-4997-A408-54821387E8C2}" type="datetime1">
               <a:rPr lang="sv-SE" smtClean="0"/>
-              <a:t>2020-03-24</a:t>
+              <a:t>2020-03-26</a:t>
             </a:fld>
             <a:endParaRPr lang="sv-SE"/>
           </a:p>
@@ -11915,7 +11978,7 @@
           <a:p>
             <a:fld id="{716563E9-3DC5-4469-9964-FF98F1612663}" type="datetime1">
               <a:rPr lang="sv-SE" smtClean="0"/>
-              <a:t>2020-03-24</a:t>
+              <a:t>2020-03-26</a:t>
             </a:fld>
             <a:endParaRPr lang="sv-SE"/>
           </a:p>
@@ -12286,7 +12349,7 @@
           <a:p>
             <a:fld id="{1CBF595A-354E-4185-8569-5903072BC314}" type="datetime1">
               <a:rPr lang="sv-SE" smtClean="0"/>
-              <a:t>2020-03-24</a:t>
+              <a:t>2020-03-26</a:t>
             </a:fld>
             <a:endParaRPr lang="sv-SE"/>
           </a:p>
@@ -12408,7 +12471,7 @@
           <a:p>
             <a:fld id="{BFCB468F-8F0C-4472-9C74-13DD7D928865}" type="datetime1">
               <a:rPr lang="sv-SE" smtClean="0"/>
-              <a:t>2020-03-24</a:t>
+              <a:t>2020-03-26</a:t>
             </a:fld>
             <a:endParaRPr lang="sv-SE"/>
           </a:p>
@@ -12507,7 +12570,7 @@
           <a:p>
             <a:fld id="{BC504758-5BE1-4D18-AD7B-70303133ACF8}" type="datetime1">
               <a:rPr lang="sv-SE" smtClean="0"/>
-              <a:t>2020-03-24</a:t>
+              <a:t>2020-03-26</a:t>
             </a:fld>
             <a:endParaRPr lang="sv-SE"/>
           </a:p>
@@ -12788,7 +12851,7 @@
           <a:p>
             <a:fld id="{250C9EB5-F68C-4689-94F6-49C30221888E}" type="datetime1">
               <a:rPr lang="sv-SE" smtClean="0"/>
-              <a:t>2020-03-24</a:t>
+              <a:t>2020-03-26</a:t>
             </a:fld>
             <a:endParaRPr lang="sv-SE"/>
           </a:p>
@@ -13049,7 +13112,7 @@
           <a:p>
             <a:fld id="{7DD110CA-AEED-4DF4-83DE-18633E56C29F}" type="datetime1">
               <a:rPr lang="sv-SE" smtClean="0"/>
-              <a:t>2020-03-24</a:t>
+              <a:t>2020-03-26</a:t>
             </a:fld>
             <a:endParaRPr lang="sv-SE"/>
           </a:p>
@@ -13223,7 +13286,7 @@
           <a:p>
             <a:fld id="{9B2AEE04-1216-4AB6-8CF8-50DAF2F9BED2}" type="datetime1">
               <a:rPr lang="sv-SE" smtClean="0"/>
-              <a:t>2020-03-24</a:t>
+              <a:t>2020-03-26</a:t>
             </a:fld>
             <a:endParaRPr lang="sv-SE"/>
           </a:p>
@@ -13407,7 +13470,7 @@
           <a:p>
             <a:fld id="{FA578C12-CAD3-4D2D-9DA2-12AF1DD8FC8B}" type="datetime1">
               <a:rPr lang="sv-SE" smtClean="0"/>
-              <a:t>2020-03-24</a:t>
+              <a:t>2020-03-26</a:t>
             </a:fld>
             <a:endParaRPr lang="sv-SE"/>
           </a:p>
@@ -13941,7 +14004,7 @@
                   <a:prstClr val="black"/>
                 </a:solidFill>
               </a:rPr>
-              <a:t>2020-03-24</a:t>
+              <a:t>2020-03-26</a:t>
             </a:fld>
             <a:endParaRPr lang="en-GB" dirty="0">
               <a:solidFill>
@@ -14361,7 +14424,7 @@
                   <a:prstClr val="black"/>
                 </a:solidFill>
               </a:rPr>
-              <a:t>2020-03-24</a:t>
+              <a:t>2020-03-26</a:t>
             </a:fld>
             <a:endParaRPr lang="en-GB" dirty="0">
               <a:solidFill>
@@ -14684,7 +14747,7 @@
                   <a:prstClr val="black"/>
                 </a:solidFill>
               </a:rPr>
-              <a:t>2020-03-24</a:t>
+              <a:t>2020-03-26</a:t>
             </a:fld>
             <a:endParaRPr lang="en-GB" dirty="0">
               <a:solidFill>
@@ -14984,7 +15047,7 @@
                   <a:prstClr val="black"/>
                 </a:solidFill>
               </a:rPr>
-              <a:t>2020-03-24</a:t>
+              <a:t>2020-03-26</a:t>
             </a:fld>
             <a:endParaRPr lang="en-GB" dirty="0">
               <a:solidFill>
@@ -15497,7 +15560,7 @@
                   <a:prstClr val="black"/>
                 </a:solidFill>
               </a:rPr>
-              <a:t>2020-03-24</a:t>
+              <a:t>2020-03-26</a:t>
             </a:fld>
             <a:endParaRPr lang="en-GB" dirty="0">
               <a:solidFill>
@@ -15734,7 +15797,7 @@
                   <a:prstClr val="black"/>
                 </a:solidFill>
               </a:rPr>
-              <a:t>2020-03-24</a:t>
+              <a:t>2020-03-26</a:t>
             </a:fld>
             <a:endParaRPr lang="en-GB" dirty="0">
               <a:solidFill>
@@ -16637,7 +16700,7 @@
           <a:p>
             <a:fld id="{B7BDDC76-5D53-4957-9832-0AD3879DA754}" type="datetime1">
               <a:rPr lang="sv-SE" smtClean="0"/>
-              <a:t>2020-03-24</a:t>
+              <a:t>2020-03-26</a:t>
             </a:fld>
             <a:endParaRPr lang="sv-SE"/>
           </a:p>
@@ -17417,12 +17480,12 @@
       </p:grpSpPr>
       <p:sp>
         <p:nvSpPr>
-          <p:cNvPr id="2" name="Content Placeholder 1"/>
-          <p:cNvSpPr>
-            <a:spLocks noGrp="1"/>
-          </p:cNvSpPr>
-          <p:nvPr>
-            <p:ph idx="1"/>
+          <p:cNvPr id="3" name="Footer Placeholder 2"/>
+          <p:cNvSpPr>
+            <a:spLocks noGrp="1"/>
+          </p:cNvSpPr>
+          <p:nvPr>
+            <p:ph type="ftr" sz="quarter" idx="11"/>
           </p:nvPr>
         </p:nvSpPr>
         <p:spPr/>
@@ -17430,58 +17493,17 @@
           <a:bodyPr/>
           <a:lstStyle/>
           <a:p>
-            <a:pPr marL="457200" indent="-457200">
-              <a:buFont typeface="Arial" panose="020B0604020202020204" pitchFamily="34" charset="0"/>
-              <a:buChar char="•"/>
-            </a:pPr>
-            <a:r>
-              <a:rPr lang="en-US" dirty="0"/>
-              <a:t>The energy system is a complicated network of processes and flows</a:t>
-            </a:r>
-          </a:p>
-          <a:p>
-            <a:pPr marL="457200" indent="-457200">
-              <a:buFont typeface="Arial" panose="020B0604020202020204" pitchFamily="34" charset="0"/>
-              <a:buChar char="•"/>
-            </a:pPr>
-            <a:r>
-              <a:rPr lang="en-US" dirty="0"/>
-              <a:t>Models are a useful tool to understand the energy system and formulate sound energy policies</a:t>
-            </a:r>
-          </a:p>
-          <a:p>
-            <a:pPr marL="457200" indent="-457200">
-              <a:buFont typeface="Arial" panose="020B0604020202020204" pitchFamily="34" charset="0"/>
-              <a:buChar char="•"/>
-            </a:pPr>
-            <a:r>
-              <a:rPr lang="en-US" dirty="0"/>
-              <a:t>Energy models provide </a:t>
-            </a:r>
-            <a:r>
-              <a:rPr lang="en-US" b="1" dirty="0"/>
-              <a:t>insights for energy policies, not numbers</a:t>
-            </a:r>
-          </a:p>
-          <a:p>
-            <a:pPr marL="457200" indent="-457200">
-              <a:buFont typeface="Arial" panose="020B0604020202020204" pitchFamily="34" charset="0"/>
-              <a:buChar char="•"/>
-            </a:pPr>
-            <a:r>
-              <a:rPr lang="en-US" dirty="0"/>
-              <a:t>Modelling tools can be categorized into top-down and bottom-up. We will look at one type of bottom-up tools: </a:t>
-            </a:r>
-            <a:r>
-              <a:rPr lang="en-US" b="1" dirty="0"/>
-              <a:t>optimization tools</a:t>
-            </a:r>
-          </a:p>
-        </p:txBody>
-      </p:sp>
-      <p:sp>
-        <p:nvSpPr>
-          <p:cNvPr id="5" name="Slide Number Placeholder 4"/>
+            <a:r>
+              <a:rPr lang="en-GB" dirty="0" smtClean="0"/>
+              <a:t>MJ2380-2381 2020</a:t>
+            </a:r>
+            <a:endParaRPr lang="en-GB" dirty="0"/>
+          </a:p>
+        </p:txBody>
+      </p:sp>
+      <p:sp>
+        <p:nvSpPr>
+          <p:cNvPr id="4" name="Slide Number Placeholder 3"/>
           <p:cNvSpPr>
             <a:spLocks noGrp="1"/>
           </p:cNvSpPr>
@@ -17494,7 +17516,7 @@
           <a:bodyPr/>
           <a:lstStyle/>
           <a:p>
-            <a:fld id="{A0B7FA9A-6BCF-4CFA-8685-B7A43319A6CD}" type="slidenum">
+            <a:fld id="{F36C87F6-986D-49E6-AF40-1B3A1EE8064D}" type="slidenum">
               <a:rPr lang="en-GB" smtClean="0"/>
               <a:pPr/>
               <a:t>11</a:t>
@@ -17505,7 +17527,7 @@
       </p:sp>
       <p:sp>
         <p:nvSpPr>
-          <p:cNvPr id="6" name="Title 5"/>
+          <p:cNvPr id="5" name="Title 4"/>
           <p:cNvSpPr>
             <a:spLocks noGrp="1"/>
           </p:cNvSpPr>
@@ -17519,69 +17541,461 @@
           <a:lstStyle/>
           <a:p>
             <a:r>
-              <a:rPr lang="sv-SE" dirty="0" err="1"/>
-              <a:t>Key</a:t>
-            </a:r>
-            <a:r>
-              <a:rPr lang="sv-SE" dirty="0"/>
-              <a:t> </a:t>
-            </a:r>
-            <a:r>
-              <a:rPr lang="sv-SE" dirty="0" err="1"/>
-              <a:t>take</a:t>
-            </a:r>
-            <a:r>
-              <a:rPr lang="sv-SE" dirty="0"/>
-              <a:t> </a:t>
-            </a:r>
-            <a:r>
-              <a:rPr lang="sv-SE" dirty="0" err="1"/>
-              <a:t>away</a:t>
-            </a:r>
-            <a:r>
-              <a:rPr lang="sv-SE" dirty="0"/>
-              <a:t> </a:t>
-            </a:r>
-            <a:r>
-              <a:rPr lang="sv-SE" dirty="0" err="1"/>
-              <a:t>messages</a:t>
+              <a:rPr lang="sv-SE" dirty="0" err="1" smtClean="0"/>
+              <a:t>Figure</a:t>
+            </a:r>
+            <a:r>
+              <a:rPr lang="sv-SE" dirty="0" smtClean="0"/>
+              <a:t> + text</a:t>
             </a:r>
             <a:endParaRPr lang="sv-SE" dirty="0"/>
           </a:p>
         </p:txBody>
       </p:sp>
-      <p:sp>
-        <p:nvSpPr>
-          <p:cNvPr id="7" name="Footer Placeholder 4"/>
-          <p:cNvSpPr>
-            <a:spLocks noGrp="1"/>
-          </p:cNvSpPr>
-          <p:nvPr>
-            <p:ph type="ftr" sz="quarter" idx="11"/>
-          </p:nvPr>
-        </p:nvSpPr>
+      <p:pic>
+        <p:nvPicPr>
+          <p:cNvPr id="6" name="Content Placeholder 6"/>
+          <p:cNvPicPr>
+            <a:picLocks noGrp="1" noChangeAspect="1"/>
+          </p:cNvPicPr>
+          <p:nvPr>
+            <p:ph idx="1"/>
+          </p:nvPr>
+        </p:nvPicPr>
+        <p:blipFill>
+          <a:blip r:embed="rId2" cstate="print">
+            <a:extLst>
+              <a:ext uri="{28A0092B-C50C-407E-A947-70E740481C1C}">
+                <a14:useLocalDpi xmlns:a14="http://schemas.microsoft.com/office/drawing/2010/main" val="0"/>
+              </a:ext>
+            </a:extLst>
+          </a:blip>
+          <a:stretch>
+            <a:fillRect/>
+          </a:stretch>
+        </p:blipFill>
         <p:spPr>
           <a:xfrm>
-            <a:off x="4038600" y="6356350"/>
-            <a:ext cx="4114800" cy="365125"/>
+            <a:off x="1033389" y="1632057"/>
+            <a:ext cx="5062695" cy="4551438"/>
           </a:xfrm>
         </p:spPr>
-        <p:txBody>
-          <a:bodyPr/>
-          <a:lstStyle/>
-          <a:p>
-            <a:r>
-              <a:rPr lang="en-GB" smtClean="0"/>
-              <a:t>MJ2380-2381 2020</a:t>
-            </a:r>
-            <a:endParaRPr lang="en-GB" dirty="0"/>
+      </p:pic>
+      <p:sp>
+        <p:nvSpPr>
+          <p:cNvPr id="7" name="Content Placeholder 1"/>
+          <p:cNvSpPr txBox="1">
+            <a:spLocks/>
+          </p:cNvSpPr>
+          <p:nvPr/>
+        </p:nvSpPr>
+        <p:spPr>
+          <a:xfrm>
+            <a:off x="6215604" y="1621738"/>
+            <a:ext cx="5138195" cy="1688621"/>
+          </a:xfrm>
+          <a:prstGeom prst="rect">
+            <a:avLst/>
+          </a:prstGeom>
+        </p:spPr>
+        <p:txBody>
+          <a:bodyPr vert="horz" lIns="91440" tIns="45720" rIns="91440" bIns="45720" rtlCol="0">
+            <a:normAutofit/>
+          </a:bodyPr>
+          <a:lstStyle>
+            <a:lvl1pPr marL="0" indent="0" algn="l" defTabSz="914400" rtl="0" eaLnBrk="1" latinLnBrk="0" hangingPunct="1">
+              <a:lnSpc>
+                <a:spcPct val="90000"/>
+              </a:lnSpc>
+              <a:spcBef>
+                <a:spcPts val="1000"/>
+              </a:spcBef>
+              <a:buFont typeface="Arial" panose="020B0604020202020204" pitchFamily="34" charset="0"/>
+              <a:buNone/>
+              <a:defRPr sz="2800" kern="1200" spc="-150">
+                <a:solidFill>
+                  <a:schemeClr val="tx1"/>
+                </a:solidFill>
+                <a:latin typeface="+mn-lt"/>
+                <a:ea typeface="+mn-ea"/>
+                <a:cs typeface="+mn-cs"/>
+              </a:defRPr>
+            </a:lvl1pPr>
+            <a:lvl2pPr marL="685800" indent="-228600" algn="l" defTabSz="914400" rtl="0" eaLnBrk="1" latinLnBrk="0" hangingPunct="1">
+              <a:lnSpc>
+                <a:spcPct val="90000"/>
+              </a:lnSpc>
+              <a:spcBef>
+                <a:spcPts val="500"/>
+              </a:spcBef>
+              <a:buFont typeface="Arial" panose="020B0604020202020204" pitchFamily="34" charset="0"/>
+              <a:buChar char="•"/>
+              <a:defRPr sz="2400" kern="1200" spc="-150">
+                <a:solidFill>
+                  <a:schemeClr val="tx1"/>
+                </a:solidFill>
+                <a:latin typeface="+mn-lt"/>
+                <a:ea typeface="+mn-ea"/>
+                <a:cs typeface="+mn-cs"/>
+              </a:defRPr>
+            </a:lvl2pPr>
+            <a:lvl3pPr marL="1143000" indent="-228600" algn="l" defTabSz="914400" rtl="0" eaLnBrk="1" latinLnBrk="0" hangingPunct="1">
+              <a:lnSpc>
+                <a:spcPct val="90000"/>
+              </a:lnSpc>
+              <a:spcBef>
+                <a:spcPts val="500"/>
+              </a:spcBef>
+              <a:buFont typeface="Arial" panose="020B0604020202020204" pitchFamily="34" charset="0"/>
+              <a:buChar char="•"/>
+              <a:defRPr sz="2000" kern="1200" spc="-150">
+                <a:solidFill>
+                  <a:schemeClr val="tx1"/>
+                </a:solidFill>
+                <a:latin typeface="+mn-lt"/>
+                <a:ea typeface="+mn-ea"/>
+                <a:cs typeface="+mn-cs"/>
+              </a:defRPr>
+            </a:lvl3pPr>
+            <a:lvl4pPr marL="1600200" indent="-228600" algn="l" defTabSz="914400" rtl="0" eaLnBrk="1" latinLnBrk="0" hangingPunct="1">
+              <a:lnSpc>
+                <a:spcPct val="90000"/>
+              </a:lnSpc>
+              <a:spcBef>
+                <a:spcPts val="500"/>
+              </a:spcBef>
+              <a:buFont typeface="Arial" panose="020B0604020202020204" pitchFamily="34" charset="0"/>
+              <a:buChar char="•"/>
+              <a:defRPr sz="1800" kern="1200" spc="-150">
+                <a:solidFill>
+                  <a:schemeClr val="tx1"/>
+                </a:solidFill>
+                <a:latin typeface="+mn-lt"/>
+                <a:ea typeface="+mn-ea"/>
+                <a:cs typeface="+mn-cs"/>
+              </a:defRPr>
+            </a:lvl4pPr>
+            <a:lvl5pPr marL="2057400" indent="-228600" algn="l" defTabSz="914400" rtl="0" eaLnBrk="1" latinLnBrk="0" hangingPunct="1">
+              <a:lnSpc>
+                <a:spcPct val="90000"/>
+              </a:lnSpc>
+              <a:spcBef>
+                <a:spcPts val="500"/>
+              </a:spcBef>
+              <a:buFont typeface="Arial" panose="020B0604020202020204" pitchFamily="34" charset="0"/>
+              <a:buChar char="•"/>
+              <a:defRPr sz="1800" kern="1200" spc="-150">
+                <a:solidFill>
+                  <a:schemeClr val="tx1"/>
+                </a:solidFill>
+                <a:latin typeface="+mn-lt"/>
+                <a:ea typeface="+mn-ea"/>
+                <a:cs typeface="+mn-cs"/>
+              </a:defRPr>
+            </a:lvl5pPr>
+            <a:lvl6pPr marL="2514600" indent="-228600" algn="l" defTabSz="914400" rtl="0" eaLnBrk="1" latinLnBrk="0" hangingPunct="1">
+              <a:lnSpc>
+                <a:spcPct val="90000"/>
+              </a:lnSpc>
+              <a:spcBef>
+                <a:spcPts val="500"/>
+              </a:spcBef>
+              <a:buFont typeface="Arial" panose="020B0604020202020204" pitchFamily="34" charset="0"/>
+              <a:buChar char="•"/>
+              <a:defRPr sz="1800" kern="1200">
+                <a:solidFill>
+                  <a:schemeClr val="tx1"/>
+                </a:solidFill>
+                <a:latin typeface="+mn-lt"/>
+                <a:ea typeface="+mn-ea"/>
+                <a:cs typeface="+mn-cs"/>
+              </a:defRPr>
+            </a:lvl6pPr>
+            <a:lvl7pPr marL="2971800" indent="-228600" algn="l" defTabSz="914400" rtl="0" eaLnBrk="1" latinLnBrk="0" hangingPunct="1">
+              <a:lnSpc>
+                <a:spcPct val="90000"/>
+              </a:lnSpc>
+              <a:spcBef>
+                <a:spcPts val="500"/>
+              </a:spcBef>
+              <a:buFont typeface="Arial" panose="020B0604020202020204" pitchFamily="34" charset="0"/>
+              <a:buChar char="•"/>
+              <a:defRPr sz="1800" kern="1200">
+                <a:solidFill>
+                  <a:schemeClr val="tx1"/>
+                </a:solidFill>
+                <a:latin typeface="+mn-lt"/>
+                <a:ea typeface="+mn-ea"/>
+                <a:cs typeface="+mn-cs"/>
+              </a:defRPr>
+            </a:lvl7pPr>
+            <a:lvl8pPr marL="3429000" indent="-228600" algn="l" defTabSz="914400" rtl="0" eaLnBrk="1" latinLnBrk="0" hangingPunct="1">
+              <a:lnSpc>
+                <a:spcPct val="90000"/>
+              </a:lnSpc>
+              <a:spcBef>
+                <a:spcPts val="500"/>
+              </a:spcBef>
+              <a:buFont typeface="Arial" panose="020B0604020202020204" pitchFamily="34" charset="0"/>
+              <a:buChar char="•"/>
+              <a:defRPr sz="1800" kern="1200">
+                <a:solidFill>
+                  <a:schemeClr val="tx1"/>
+                </a:solidFill>
+                <a:latin typeface="+mn-lt"/>
+                <a:ea typeface="+mn-ea"/>
+                <a:cs typeface="+mn-cs"/>
+              </a:defRPr>
+            </a:lvl8pPr>
+            <a:lvl9pPr marL="3886200" indent="-228600" algn="l" defTabSz="914400" rtl="0" eaLnBrk="1" latinLnBrk="0" hangingPunct="1">
+              <a:lnSpc>
+                <a:spcPct val="90000"/>
+              </a:lnSpc>
+              <a:spcBef>
+                <a:spcPts val="500"/>
+              </a:spcBef>
+              <a:buFont typeface="Arial" panose="020B0604020202020204" pitchFamily="34" charset="0"/>
+              <a:buChar char="•"/>
+              <a:defRPr sz="1800" kern="1200">
+                <a:solidFill>
+                  <a:schemeClr val="tx1"/>
+                </a:solidFill>
+                <a:latin typeface="+mn-lt"/>
+                <a:ea typeface="+mn-ea"/>
+                <a:cs typeface="+mn-cs"/>
+              </a:defRPr>
+            </a:lvl9pPr>
+          </a:lstStyle>
+          <a:p>
+            <a:pPr>
+              <a:defRPr/>
+            </a:pPr>
+            <a:r>
+              <a:rPr lang="en-US" sz="2400" dirty="0" smtClean="0"/>
+              <a:t>Text on the right of the picture,</a:t>
+            </a:r>
+          </a:p>
+          <a:p>
+            <a:pPr>
+              <a:defRPr/>
+            </a:pPr>
+            <a:r>
+              <a:rPr lang="en-US" sz="2400" dirty="0" smtClean="0"/>
+              <a:t>Might be difficult </a:t>
+            </a:r>
+            <a:r>
+              <a:rPr lang="en-US" sz="2400" dirty="0"/>
+              <a:t> </a:t>
+            </a:r>
+            <a:r>
+              <a:rPr lang="en-US" sz="2400" dirty="0" smtClean="0"/>
+              <a:t>to make it show in the slide</a:t>
+            </a:r>
+            <a:endParaRPr lang="en-US" sz="2400" dirty="0"/>
+          </a:p>
+        </p:txBody>
+      </p:sp>
+      <p:sp>
+        <p:nvSpPr>
+          <p:cNvPr id="8" name="Content Placeholder 1"/>
+          <p:cNvSpPr txBox="1">
+            <a:spLocks/>
+          </p:cNvSpPr>
+          <p:nvPr/>
+        </p:nvSpPr>
+        <p:spPr>
+          <a:xfrm>
+            <a:off x="6335208" y="3298094"/>
+            <a:ext cx="5138195" cy="1688621"/>
+          </a:xfrm>
+          <a:prstGeom prst="rect">
+            <a:avLst/>
+          </a:prstGeom>
+        </p:spPr>
+        <p:txBody>
+          <a:bodyPr vert="horz" lIns="91440" tIns="45720" rIns="91440" bIns="45720" rtlCol="0">
+            <a:normAutofit/>
+          </a:bodyPr>
+          <a:lstStyle>
+            <a:lvl1pPr marL="0" indent="0" algn="l" defTabSz="914400" rtl="0" eaLnBrk="1" latinLnBrk="0" hangingPunct="1">
+              <a:lnSpc>
+                <a:spcPct val="90000"/>
+              </a:lnSpc>
+              <a:spcBef>
+                <a:spcPts val="1000"/>
+              </a:spcBef>
+              <a:buFont typeface="Arial" panose="020B0604020202020204" pitchFamily="34" charset="0"/>
+              <a:buNone/>
+              <a:defRPr sz="2800" kern="1200" spc="-150">
+                <a:solidFill>
+                  <a:schemeClr val="tx1"/>
+                </a:solidFill>
+                <a:latin typeface="+mn-lt"/>
+                <a:ea typeface="+mn-ea"/>
+                <a:cs typeface="+mn-cs"/>
+              </a:defRPr>
+            </a:lvl1pPr>
+            <a:lvl2pPr marL="685800" indent="-228600" algn="l" defTabSz="914400" rtl="0" eaLnBrk="1" latinLnBrk="0" hangingPunct="1">
+              <a:lnSpc>
+                <a:spcPct val="90000"/>
+              </a:lnSpc>
+              <a:spcBef>
+                <a:spcPts val="500"/>
+              </a:spcBef>
+              <a:buFont typeface="Arial" panose="020B0604020202020204" pitchFamily="34" charset="0"/>
+              <a:buChar char="•"/>
+              <a:defRPr sz="2400" kern="1200" spc="-150">
+                <a:solidFill>
+                  <a:schemeClr val="tx1"/>
+                </a:solidFill>
+                <a:latin typeface="+mn-lt"/>
+                <a:ea typeface="+mn-ea"/>
+                <a:cs typeface="+mn-cs"/>
+              </a:defRPr>
+            </a:lvl2pPr>
+            <a:lvl3pPr marL="1143000" indent="-228600" algn="l" defTabSz="914400" rtl="0" eaLnBrk="1" latinLnBrk="0" hangingPunct="1">
+              <a:lnSpc>
+                <a:spcPct val="90000"/>
+              </a:lnSpc>
+              <a:spcBef>
+                <a:spcPts val="500"/>
+              </a:spcBef>
+              <a:buFont typeface="Arial" panose="020B0604020202020204" pitchFamily="34" charset="0"/>
+              <a:buChar char="•"/>
+              <a:defRPr sz="2000" kern="1200" spc="-150">
+                <a:solidFill>
+                  <a:schemeClr val="tx1"/>
+                </a:solidFill>
+                <a:latin typeface="+mn-lt"/>
+                <a:ea typeface="+mn-ea"/>
+                <a:cs typeface="+mn-cs"/>
+              </a:defRPr>
+            </a:lvl3pPr>
+            <a:lvl4pPr marL="1600200" indent="-228600" algn="l" defTabSz="914400" rtl="0" eaLnBrk="1" latinLnBrk="0" hangingPunct="1">
+              <a:lnSpc>
+                <a:spcPct val="90000"/>
+              </a:lnSpc>
+              <a:spcBef>
+                <a:spcPts val="500"/>
+              </a:spcBef>
+              <a:buFont typeface="Arial" panose="020B0604020202020204" pitchFamily="34" charset="0"/>
+              <a:buChar char="•"/>
+              <a:defRPr sz="1800" kern="1200" spc="-150">
+                <a:solidFill>
+                  <a:schemeClr val="tx1"/>
+                </a:solidFill>
+                <a:latin typeface="+mn-lt"/>
+                <a:ea typeface="+mn-ea"/>
+                <a:cs typeface="+mn-cs"/>
+              </a:defRPr>
+            </a:lvl4pPr>
+            <a:lvl5pPr marL="2057400" indent="-228600" algn="l" defTabSz="914400" rtl="0" eaLnBrk="1" latinLnBrk="0" hangingPunct="1">
+              <a:lnSpc>
+                <a:spcPct val="90000"/>
+              </a:lnSpc>
+              <a:spcBef>
+                <a:spcPts val="500"/>
+              </a:spcBef>
+              <a:buFont typeface="Arial" panose="020B0604020202020204" pitchFamily="34" charset="0"/>
+              <a:buChar char="•"/>
+              <a:defRPr sz="1800" kern="1200" spc="-150">
+                <a:solidFill>
+                  <a:schemeClr val="tx1"/>
+                </a:solidFill>
+                <a:latin typeface="+mn-lt"/>
+                <a:ea typeface="+mn-ea"/>
+                <a:cs typeface="+mn-cs"/>
+              </a:defRPr>
+            </a:lvl5pPr>
+            <a:lvl6pPr marL="2514600" indent="-228600" algn="l" defTabSz="914400" rtl="0" eaLnBrk="1" latinLnBrk="0" hangingPunct="1">
+              <a:lnSpc>
+                <a:spcPct val="90000"/>
+              </a:lnSpc>
+              <a:spcBef>
+                <a:spcPts val="500"/>
+              </a:spcBef>
+              <a:buFont typeface="Arial" panose="020B0604020202020204" pitchFamily="34" charset="0"/>
+              <a:buChar char="•"/>
+              <a:defRPr sz="1800" kern="1200">
+                <a:solidFill>
+                  <a:schemeClr val="tx1"/>
+                </a:solidFill>
+                <a:latin typeface="+mn-lt"/>
+                <a:ea typeface="+mn-ea"/>
+                <a:cs typeface="+mn-cs"/>
+              </a:defRPr>
+            </a:lvl6pPr>
+            <a:lvl7pPr marL="2971800" indent="-228600" algn="l" defTabSz="914400" rtl="0" eaLnBrk="1" latinLnBrk="0" hangingPunct="1">
+              <a:lnSpc>
+                <a:spcPct val="90000"/>
+              </a:lnSpc>
+              <a:spcBef>
+                <a:spcPts val="500"/>
+              </a:spcBef>
+              <a:buFont typeface="Arial" panose="020B0604020202020204" pitchFamily="34" charset="0"/>
+              <a:buChar char="•"/>
+              <a:defRPr sz="1800" kern="1200">
+                <a:solidFill>
+                  <a:schemeClr val="tx1"/>
+                </a:solidFill>
+                <a:latin typeface="+mn-lt"/>
+                <a:ea typeface="+mn-ea"/>
+                <a:cs typeface="+mn-cs"/>
+              </a:defRPr>
+            </a:lvl7pPr>
+            <a:lvl8pPr marL="3429000" indent="-228600" algn="l" defTabSz="914400" rtl="0" eaLnBrk="1" latinLnBrk="0" hangingPunct="1">
+              <a:lnSpc>
+                <a:spcPct val="90000"/>
+              </a:lnSpc>
+              <a:spcBef>
+                <a:spcPts val="500"/>
+              </a:spcBef>
+              <a:buFont typeface="Arial" panose="020B0604020202020204" pitchFamily="34" charset="0"/>
+              <a:buChar char="•"/>
+              <a:defRPr sz="1800" kern="1200">
+                <a:solidFill>
+                  <a:schemeClr val="tx1"/>
+                </a:solidFill>
+                <a:latin typeface="+mn-lt"/>
+                <a:ea typeface="+mn-ea"/>
+                <a:cs typeface="+mn-cs"/>
+              </a:defRPr>
+            </a:lvl8pPr>
+            <a:lvl9pPr marL="3886200" indent="-228600" algn="l" defTabSz="914400" rtl="0" eaLnBrk="1" latinLnBrk="0" hangingPunct="1">
+              <a:lnSpc>
+                <a:spcPct val="90000"/>
+              </a:lnSpc>
+              <a:spcBef>
+                <a:spcPts val="500"/>
+              </a:spcBef>
+              <a:buFont typeface="Arial" panose="020B0604020202020204" pitchFamily="34" charset="0"/>
+              <a:buChar char="•"/>
+              <a:defRPr sz="1800" kern="1200">
+                <a:solidFill>
+                  <a:schemeClr val="tx1"/>
+                </a:solidFill>
+                <a:latin typeface="+mn-lt"/>
+                <a:ea typeface="+mn-ea"/>
+                <a:cs typeface="+mn-cs"/>
+              </a:defRPr>
+            </a:lvl9pPr>
+          </a:lstStyle>
+          <a:p>
+            <a:pPr>
+              <a:defRPr/>
+            </a:pPr>
+            <a:r>
+              <a:rPr lang="en-US" sz="2400" dirty="0" smtClean="0"/>
+              <a:t>Second text box next to the picture</a:t>
+            </a:r>
+            <a:endParaRPr lang="en-US" sz="2400" dirty="0"/>
           </a:p>
         </p:txBody>
       </p:sp>
     </p:spTree>
     <p:extLst>
       <p:ext uri="{BB962C8B-B14F-4D97-AF65-F5344CB8AC3E}">
-        <p14:creationId xmlns:p14="http://schemas.microsoft.com/office/powerpoint/2010/main" val="2837304566"/>
+        <p14:creationId xmlns:p14="http://schemas.microsoft.com/office/powerpoint/2010/main" val="3640970149"/>
       </p:ext>
     </p:extLst>
   </p:cSld>
@@ -17600,13 +18014,6 @@
       </p:transition>
     </mc:Fallback>
   </mc:AlternateContent>
-  <p:timing>
-    <p:tnLst>
-      <p:par>
-        <p:cTn id="1" dur="indefinite" restart="never" nodeType="tmRoot"/>
-      </p:par>
-    </p:tnLst>
-  </p:timing>
 </p:sld>
 </file>
 
@@ -17642,66 +18049,51 @@
           <a:bodyPr/>
           <a:lstStyle/>
           <a:p>
-            <a:pPr marL="285750" lvl="1" indent="-285750">
-              <a:spcAft>
-                <a:spcPct val="50000"/>
-              </a:spcAft>
+            <a:pPr marL="457200" indent="-457200">
+              <a:buFont typeface="Arial" panose="020B0604020202020204" pitchFamily="34" charset="0"/>
+              <a:buChar char="•"/>
             </a:pPr>
             <a:r>
-              <a:rPr lang="sv-SE" dirty="0"/>
-              <a:t>Modelling for insights, not numbers - Huntington et al.  (1982): </a:t>
-            </a:r>
-            <a:r>
-              <a:rPr lang="sv-SE" dirty="0">
-                <a:hlinkClick r:id="rId3"/>
-              </a:rPr>
-              <a:t>https://www.sciencedirect.com/science/article/pii/0305048382900020</a:t>
-            </a:r>
-            <a:r>
-              <a:rPr lang="sv-SE" dirty="0"/>
-              <a:t> </a:t>
-            </a:r>
-          </a:p>
-          <a:p>
-            <a:pPr marL="285750" lvl="1" indent="-285750">
-              <a:spcAft>
-                <a:spcPct val="50000"/>
-              </a:spcAft>
+              <a:rPr lang="en-US" dirty="0"/>
+              <a:t>The energy system is a complicated network of processes and flows</a:t>
+            </a:r>
+          </a:p>
+          <a:p>
+            <a:pPr marL="457200" indent="-457200">
+              <a:buFont typeface="Arial" panose="020B0604020202020204" pitchFamily="34" charset="0"/>
+              <a:buChar char="•"/>
             </a:pPr>
             <a:r>
-              <a:rPr lang="sv-SE" dirty="0"/>
-              <a:t>Categorisation of modelling tools – Herbst et al. (2012): </a:t>
-            </a:r>
-            <a:r>
-              <a:rPr lang="sv-SE" dirty="0">
-                <a:hlinkClick r:id="rId4"/>
-              </a:rPr>
-              <a:t>https://link.springer.com/content/pdf/10.1007%2FBF03399363.pdf</a:t>
-            </a:r>
-            <a:r>
-              <a:rPr lang="sv-SE" dirty="0"/>
-              <a:t> </a:t>
-            </a:r>
-          </a:p>
-          <a:p>
-            <a:pPr marL="285750" lvl="1" indent="-285750">
-              <a:spcAft>
-                <a:spcPct val="50000"/>
-              </a:spcAft>
+              <a:rPr lang="en-US" dirty="0"/>
+              <a:t>Models are a useful tool to understand the energy system and formulate sound energy policies</a:t>
+            </a:r>
+          </a:p>
+          <a:p>
+            <a:pPr marL="457200" indent="-457200">
+              <a:buFont typeface="Arial" panose="020B0604020202020204" pitchFamily="34" charset="0"/>
+              <a:buChar char="•"/>
             </a:pPr>
             <a:r>
-              <a:rPr lang="sv-SE" dirty="0"/>
-              <a:t>Review of different categorisation methods – Müller et al. (2018): </a:t>
-            </a:r>
-            <a:r>
-              <a:rPr lang="sv-SE" dirty="0">
-                <a:hlinkClick r:id="rId5"/>
-              </a:rPr>
-              <a:t>https://www.sciencedirect.com/science/article/pii/S2211467X18300154</a:t>
-            </a:r>
-            <a:r>
-              <a:rPr lang="sv-SE" dirty="0"/>
-              <a:t> </a:t>
+              <a:rPr lang="en-US" dirty="0"/>
+              <a:t>Energy models provide </a:t>
+            </a:r>
+            <a:r>
+              <a:rPr lang="en-US" b="1" dirty="0"/>
+              <a:t>insights for energy policies, not numbers</a:t>
+            </a:r>
+          </a:p>
+          <a:p>
+            <a:pPr marL="457200" indent="-457200">
+              <a:buFont typeface="Arial" panose="020B0604020202020204" pitchFamily="34" charset="0"/>
+              <a:buChar char="•"/>
+            </a:pPr>
+            <a:r>
+              <a:rPr lang="en-US" dirty="0"/>
+              <a:t>Modelling tools can be categorized into top-down and bottom-up. We will look at one type of bottom-up tools: </a:t>
+            </a:r>
+            <a:r>
+              <a:rPr lang="en-US" b="1" dirty="0"/>
+              <a:t>optimization tools</a:t>
             </a:r>
           </a:p>
         </p:txBody>
@@ -17746,9 +18138,34 @@
           <a:lstStyle/>
           <a:p>
             <a:r>
+              <a:rPr lang="sv-SE" dirty="0" err="1"/>
+              <a:t>Key</a:t>
+            </a:r>
+            <a:r>
               <a:rPr lang="sv-SE" dirty="0"/>
-              <a:t>Reading material</a:t>
-            </a:r>
+              <a:t> </a:t>
+            </a:r>
+            <a:r>
+              <a:rPr lang="sv-SE" dirty="0" err="1"/>
+              <a:t>take</a:t>
+            </a:r>
+            <a:r>
+              <a:rPr lang="sv-SE" dirty="0"/>
+              <a:t> </a:t>
+            </a:r>
+            <a:r>
+              <a:rPr lang="sv-SE" dirty="0" err="1"/>
+              <a:t>away</a:t>
+            </a:r>
+            <a:r>
+              <a:rPr lang="sv-SE" dirty="0"/>
+              <a:t> </a:t>
+            </a:r>
+            <a:r>
+              <a:rPr lang="sv-SE" dirty="0" err="1"/>
+              <a:t>messages</a:t>
+            </a:r>
+            <a:endParaRPr lang="sv-SE" dirty="0"/>
           </a:p>
         </p:txBody>
       </p:sp>
@@ -17783,7 +18200,7 @@
     </p:spTree>
     <p:extLst>
       <p:ext uri="{BB962C8B-B14F-4D97-AF65-F5344CB8AC3E}">
-        <p14:creationId xmlns:p14="http://schemas.microsoft.com/office/powerpoint/2010/main" val="1208241015"/>
+        <p14:creationId xmlns:p14="http://schemas.microsoft.com/office/powerpoint/2010/main" val="2837304566"/>
       </p:ext>
     </p:extLst>
   </p:cSld>
@@ -17831,6 +18248,208 @@
       </p:grpSpPr>
       <p:sp>
         <p:nvSpPr>
+          <p:cNvPr id="2" name="Content Placeholder 1"/>
+          <p:cNvSpPr>
+            <a:spLocks noGrp="1"/>
+          </p:cNvSpPr>
+          <p:nvPr>
+            <p:ph idx="1"/>
+          </p:nvPr>
+        </p:nvSpPr>
+        <p:spPr/>
+        <p:txBody>
+          <a:bodyPr/>
+          <a:lstStyle/>
+          <a:p>
+            <a:pPr marL="285750" lvl="1" indent="-285750">
+              <a:spcAft>
+                <a:spcPct val="50000"/>
+              </a:spcAft>
+            </a:pPr>
+            <a:r>
+              <a:rPr lang="sv-SE" dirty="0"/>
+              <a:t>Modelling for insights, not numbers - Huntington et al.  (1982): </a:t>
+            </a:r>
+            <a:r>
+              <a:rPr lang="sv-SE" dirty="0">
+                <a:hlinkClick r:id="rId3"/>
+              </a:rPr>
+              <a:t>https://www.sciencedirect.com/science/article/pii/0305048382900020</a:t>
+            </a:r>
+            <a:r>
+              <a:rPr lang="sv-SE" dirty="0"/>
+              <a:t> </a:t>
+            </a:r>
+          </a:p>
+          <a:p>
+            <a:pPr marL="285750" lvl="1" indent="-285750">
+              <a:spcAft>
+                <a:spcPct val="50000"/>
+              </a:spcAft>
+            </a:pPr>
+            <a:r>
+              <a:rPr lang="sv-SE" dirty="0"/>
+              <a:t>Categorisation of modelling tools – Herbst et al. (2012): </a:t>
+            </a:r>
+            <a:r>
+              <a:rPr lang="sv-SE" dirty="0">
+                <a:hlinkClick r:id="rId4"/>
+              </a:rPr>
+              <a:t>https://link.springer.com/content/pdf/10.1007%2FBF03399363.pdf</a:t>
+            </a:r>
+            <a:r>
+              <a:rPr lang="sv-SE" dirty="0"/>
+              <a:t> </a:t>
+            </a:r>
+          </a:p>
+          <a:p>
+            <a:pPr marL="285750" lvl="1" indent="-285750">
+              <a:spcAft>
+                <a:spcPct val="50000"/>
+              </a:spcAft>
+            </a:pPr>
+            <a:r>
+              <a:rPr lang="sv-SE" dirty="0"/>
+              <a:t>Review of different categorisation methods – Müller et al. (2018): </a:t>
+            </a:r>
+            <a:r>
+              <a:rPr lang="sv-SE" dirty="0">
+                <a:hlinkClick r:id="rId5"/>
+              </a:rPr>
+              <a:t>https://www.sciencedirect.com/science/article/pii/S2211467X18300154</a:t>
+            </a:r>
+            <a:r>
+              <a:rPr lang="sv-SE" dirty="0"/>
+              <a:t> </a:t>
+            </a:r>
+          </a:p>
+        </p:txBody>
+      </p:sp>
+      <p:sp>
+        <p:nvSpPr>
+          <p:cNvPr id="5" name="Slide Number Placeholder 4"/>
+          <p:cNvSpPr>
+            <a:spLocks noGrp="1"/>
+          </p:cNvSpPr>
+          <p:nvPr>
+            <p:ph type="sldNum" sz="quarter" idx="12"/>
+          </p:nvPr>
+        </p:nvSpPr>
+        <p:spPr/>
+        <p:txBody>
+          <a:bodyPr/>
+          <a:lstStyle/>
+          <a:p>
+            <a:fld id="{A0B7FA9A-6BCF-4CFA-8685-B7A43319A6CD}" type="slidenum">
+              <a:rPr lang="en-GB" smtClean="0"/>
+              <a:pPr/>
+              <a:t>13</a:t>
+            </a:fld>
+            <a:endParaRPr lang="en-GB" dirty="0"/>
+          </a:p>
+        </p:txBody>
+      </p:sp>
+      <p:sp>
+        <p:nvSpPr>
+          <p:cNvPr id="6" name="Title 5"/>
+          <p:cNvSpPr>
+            <a:spLocks noGrp="1"/>
+          </p:cNvSpPr>
+          <p:nvPr>
+            <p:ph type="title"/>
+          </p:nvPr>
+        </p:nvSpPr>
+        <p:spPr/>
+        <p:txBody>
+          <a:bodyPr/>
+          <a:lstStyle/>
+          <a:p>
+            <a:r>
+              <a:rPr lang="sv-SE" dirty="0"/>
+              <a:t>Reading material</a:t>
+            </a:r>
+          </a:p>
+        </p:txBody>
+      </p:sp>
+      <p:sp>
+        <p:nvSpPr>
+          <p:cNvPr id="7" name="Footer Placeholder 4"/>
+          <p:cNvSpPr>
+            <a:spLocks noGrp="1"/>
+          </p:cNvSpPr>
+          <p:nvPr>
+            <p:ph type="ftr" sz="quarter" idx="11"/>
+          </p:nvPr>
+        </p:nvSpPr>
+        <p:spPr>
+          <a:xfrm>
+            <a:off x="4038600" y="6356350"/>
+            <a:ext cx="4114800" cy="365125"/>
+          </a:xfrm>
+        </p:spPr>
+        <p:txBody>
+          <a:bodyPr/>
+          <a:lstStyle/>
+          <a:p>
+            <a:r>
+              <a:rPr lang="en-GB" smtClean="0"/>
+              <a:t>MJ2380-2381 2020</a:t>
+            </a:r>
+            <a:endParaRPr lang="en-GB" dirty="0"/>
+          </a:p>
+        </p:txBody>
+      </p:sp>
+    </p:spTree>
+    <p:extLst>
+      <p:ext uri="{BB962C8B-B14F-4D97-AF65-F5344CB8AC3E}">
+        <p14:creationId xmlns:p14="http://schemas.microsoft.com/office/powerpoint/2010/main" val="1208241015"/>
+      </p:ext>
+    </p:extLst>
+  </p:cSld>
+  <p:clrMapOvr>
+    <a:masterClrMapping/>
+  </p:clrMapOvr>
+  <mc:AlternateContent xmlns:mc="http://schemas.openxmlformats.org/markup-compatibility/2006" xmlns:p14="http://schemas.microsoft.com/office/powerpoint/2010/main">
+    <mc:Choice Requires="p14">
+      <p:transition spd="med" p14:dur="700">
+        <p:fade/>
+      </p:transition>
+    </mc:Choice>
+    <mc:Fallback xmlns="">
+      <p:transition spd="med">
+        <p:fade/>
+      </p:transition>
+    </mc:Fallback>
+  </mc:AlternateContent>
+  <p:timing>
+    <p:tnLst>
+      <p:par>
+        <p:cTn id="1" dur="indefinite" restart="never" nodeType="tmRoot"/>
+      </p:par>
+    </p:tnLst>
+  </p:timing>
+</p:sld>
+</file>
+
+<file path=ppt/slides/slide14.xml><?xml version="1.0" encoding="utf-8"?>
+<p:sld xmlns:a="http://schemas.openxmlformats.org/drawingml/2006/main" xmlns:r="http://schemas.openxmlformats.org/officeDocument/2006/relationships" xmlns:p="http://schemas.openxmlformats.org/presentationml/2006/main">
+  <p:cSld>
+    <p:spTree>
+      <p:nvGrpSpPr>
+        <p:cNvPr id="1" name=""/>
+        <p:cNvGrpSpPr/>
+        <p:nvPr/>
+      </p:nvGrpSpPr>
+      <p:grpSpPr>
+        <a:xfrm>
+          <a:off x="0" y="0"/>
+          <a:ext cx="0" cy="0"/>
+          <a:chOff x="0" y="0"/>
+          <a:chExt cx="0" cy="0"/>
+        </a:xfrm>
+      </p:grpSpPr>
+      <p:sp>
+        <p:nvSpPr>
           <p:cNvPr id="3" name="Title 2"/>
           <p:cNvSpPr>
             <a:spLocks noGrp="1"/>
@@ -17914,7 +18533,7 @@
                 </a:solidFill>
               </a:rPr>
               <a:pPr/>
-              <a:t>13</a:t>
+              <a:t>14</a:t>
             </a:fld>
             <a:endParaRPr lang="en-GB" sz="1400" dirty="0">
               <a:solidFill>
@@ -20832,7 +21451,7 @@
 </file>
 
 <file path=customXml/itemProps2.xml><?xml version="1.0" encoding="utf-8"?>
-<ds:datastoreItem xmlns:ds="http://schemas.openxmlformats.org/officeDocument/2006/customXml" ds:itemID="{834A27C6-F506-436C-BE80-EBD990020008}">
+<ds:datastoreItem xmlns:ds="http://schemas.openxmlformats.org/officeDocument/2006/customXml" ds:itemID="{C617D7A1-438A-4842-B3E3-9908A6EB6D2C}">
   <ds:schemaRefs>
     <ds:schemaRef ds:uri="http://schemas.microsoft.com/VisualStudio/2011/storyboarding/control"/>
   </ds:schemaRefs>
@@ -20840,7 +21459,7 @@
 </file>
 
 <file path=customXml/itemProps3.xml><?xml version="1.0" encoding="utf-8"?>
-<ds:datastoreItem xmlns:ds="http://schemas.openxmlformats.org/officeDocument/2006/customXml" ds:itemID="{0103A532-5B2C-4425-9F2A-7F4721A16C4C}">
+<ds:datastoreItem xmlns:ds="http://schemas.openxmlformats.org/officeDocument/2006/customXml" ds:itemID="{834A27C6-F506-436C-BE80-EBD990020008}">
   <ds:schemaRefs>
     <ds:schemaRef ds:uri="http://schemas.microsoft.com/VisualStudio/2011/storyboarding/control"/>
   </ds:schemaRefs>
@@ -20856,7 +21475,7 @@
 </file>
 
 <file path=customXml/itemProps5.xml><?xml version="1.0" encoding="utf-8"?>
-<ds:datastoreItem xmlns:ds="http://schemas.openxmlformats.org/officeDocument/2006/customXml" ds:itemID="{2611C6C5-73A8-4088-8E8F-45AC80A93639}">
+<ds:datastoreItem xmlns:ds="http://schemas.openxmlformats.org/officeDocument/2006/customXml" ds:itemID="{1CFCFB3A-1124-4BB9-AF75-CF97631426FE}">
   <ds:schemaRefs>
     <ds:schemaRef ds:uri="http://schemas.microsoft.com/VisualStudio/2011/storyboarding/control"/>
   </ds:schemaRefs>
@@ -20864,7 +21483,7 @@
 </file>
 
 <file path=customXml/itemProps6.xml><?xml version="1.0" encoding="utf-8"?>
-<ds:datastoreItem xmlns:ds="http://schemas.openxmlformats.org/officeDocument/2006/customXml" ds:itemID="{C617D7A1-438A-4842-B3E3-9908A6EB6D2C}">
+<ds:datastoreItem xmlns:ds="http://schemas.openxmlformats.org/officeDocument/2006/customXml" ds:itemID="{0103A532-5B2C-4425-9F2A-7F4721A16C4C}">
   <ds:schemaRefs>
     <ds:schemaRef ds:uri="http://schemas.microsoft.com/VisualStudio/2011/storyboarding/control"/>
   </ds:schemaRefs>
@@ -20872,7 +21491,7 @@
 </file>
 
 <file path=customXml/itemProps7.xml><?xml version="1.0" encoding="utf-8"?>
-<ds:datastoreItem xmlns:ds="http://schemas.openxmlformats.org/officeDocument/2006/customXml" ds:itemID="{E01F304E-8A23-4F3A-A522-8F0F304C2F57}">
+<ds:datastoreItem xmlns:ds="http://schemas.openxmlformats.org/officeDocument/2006/customXml" ds:itemID="{2611C6C5-73A8-4088-8E8F-45AC80A93639}">
   <ds:schemaRefs>
     <ds:schemaRef ds:uri="http://schemas.microsoft.com/VisualStudio/2011/storyboarding/control"/>
   </ds:schemaRefs>
@@ -20888,7 +21507,7 @@
 </file>
 
 <file path=customXml/itemProps9.xml><?xml version="1.0" encoding="utf-8"?>
-<ds:datastoreItem xmlns:ds="http://schemas.openxmlformats.org/officeDocument/2006/customXml" ds:itemID="{1CFCFB3A-1124-4BB9-AF75-CF97631426FE}">
+<ds:datastoreItem xmlns:ds="http://schemas.openxmlformats.org/officeDocument/2006/customXml" ds:itemID="{E01F304E-8A23-4F3A-A522-8F0F304C2F57}">
   <ds:schemaRefs>
     <ds:schemaRef ds:uri="http://schemas.microsoft.com/VisualStudio/2011/storyboarding/control"/>
   </ds:schemaRefs>

</xml_diff>